<commit_message>
Update Business Case Study Presentation.pptx
</commit_message>
<xml_diff>
--- a/Business Case Study Presentation.pptx
+++ b/Business Case Study Presentation.pptx
@@ -127,6 +127,11 @@
       </a:defRPr>
     </a:lvl9pPr>
   </p:defaultTextStyle>
+  <p:extLst>
+    <p:ext uri="{EFAFB233-063F-42B5-8137-9DF3F51BA10A}">
+      <p15:sldGuideLst xmlns:p15="http://schemas.microsoft.com/office/powerpoint/2012/main"/>
+    </p:ext>
+  </p:extLst>
 </p:presentation>
 </file>
 
@@ -277,7 +282,7 @@
           <a:p>
             <a:fld id="{0DF7EFAF-1BF7-45C2-8EDA-157E1C031170}" type="datetimeFigureOut">
               <a:rPr lang="en-US" smtClean="0"/>
-              <a:t>9/27/2020</a:t>
+              <a:t>8/23/2021</a:t>
             </a:fld>
             <a:endParaRPr lang="en-US"/>
           </a:p>
@@ -475,7 +480,7 @@
           <a:p>
             <a:fld id="{0DF7EFAF-1BF7-45C2-8EDA-157E1C031170}" type="datetimeFigureOut">
               <a:rPr lang="en-US" smtClean="0"/>
-              <a:t>9/27/2020</a:t>
+              <a:t>8/23/2021</a:t>
             </a:fld>
             <a:endParaRPr lang="en-US"/>
           </a:p>
@@ -683,7 +688,7 @@
           <a:p>
             <a:fld id="{0DF7EFAF-1BF7-45C2-8EDA-157E1C031170}" type="datetimeFigureOut">
               <a:rPr lang="en-US" smtClean="0"/>
-              <a:t>9/27/2020</a:t>
+              <a:t>8/23/2021</a:t>
             </a:fld>
             <a:endParaRPr lang="en-US"/>
           </a:p>
@@ -3080,7 +3085,7 @@
           <a:p>
             <a:fld id="{0DF7EFAF-1BF7-45C2-8EDA-157E1C031170}" type="datetimeFigureOut">
               <a:rPr lang="en-US" smtClean="0"/>
-              <a:t>9/27/2020</a:t>
+              <a:t>8/23/2021</a:t>
             </a:fld>
             <a:endParaRPr lang="en-US"/>
           </a:p>
@@ -4152,7 +4157,7 @@
           <a:p>
             <a:fld id="{0DF7EFAF-1BF7-45C2-8EDA-157E1C031170}" type="datetimeFigureOut">
               <a:rPr lang="en-US" smtClean="0"/>
-              <a:t>9/27/2020</a:t>
+              <a:t>8/23/2021</a:t>
             </a:fld>
             <a:endParaRPr lang="en-US"/>
           </a:p>
@@ -4417,7 +4422,7 @@
           <a:p>
             <a:fld id="{0DF7EFAF-1BF7-45C2-8EDA-157E1C031170}" type="datetimeFigureOut">
               <a:rPr lang="en-US" smtClean="0"/>
-              <a:t>9/27/2020</a:t>
+              <a:t>8/23/2021</a:t>
             </a:fld>
             <a:endParaRPr lang="en-US"/>
           </a:p>
@@ -4829,7 +4834,7 @@
           <a:p>
             <a:fld id="{0DF7EFAF-1BF7-45C2-8EDA-157E1C031170}" type="datetimeFigureOut">
               <a:rPr lang="en-US" smtClean="0"/>
-              <a:t>9/27/2020</a:t>
+              <a:t>8/23/2021</a:t>
             </a:fld>
             <a:endParaRPr lang="en-US"/>
           </a:p>
@@ -4970,7 +4975,7 @@
           <a:p>
             <a:fld id="{0DF7EFAF-1BF7-45C2-8EDA-157E1C031170}" type="datetimeFigureOut">
               <a:rPr lang="en-US" smtClean="0"/>
-              <a:t>9/27/2020</a:t>
+              <a:t>8/23/2021</a:t>
             </a:fld>
             <a:endParaRPr lang="en-US"/>
           </a:p>
@@ -5083,7 +5088,7 @@
           <a:p>
             <a:fld id="{0DF7EFAF-1BF7-45C2-8EDA-157E1C031170}" type="datetimeFigureOut">
               <a:rPr lang="en-US" smtClean="0"/>
-              <a:t>9/27/2020</a:t>
+              <a:t>8/23/2021</a:t>
             </a:fld>
             <a:endParaRPr lang="en-US"/>
           </a:p>
@@ -5394,7 +5399,7 @@
           <a:p>
             <a:fld id="{0DF7EFAF-1BF7-45C2-8EDA-157E1C031170}" type="datetimeFigureOut">
               <a:rPr lang="en-US" smtClean="0"/>
-              <a:t>9/27/2020</a:t>
+              <a:t>8/23/2021</a:t>
             </a:fld>
             <a:endParaRPr lang="en-US"/>
           </a:p>
@@ -5682,7 +5687,7 @@
           <a:p>
             <a:fld id="{0DF7EFAF-1BF7-45C2-8EDA-157E1C031170}" type="datetimeFigureOut">
               <a:rPr lang="en-US" smtClean="0"/>
-              <a:t>9/27/2020</a:t>
+              <a:t>8/23/2021</a:t>
             </a:fld>
             <a:endParaRPr lang="en-US"/>
           </a:p>
@@ -5923,7 +5928,7 @@
           <a:p>
             <a:fld id="{0DF7EFAF-1BF7-45C2-8EDA-157E1C031170}" type="datetimeFigureOut">
               <a:rPr lang="en-US" smtClean="0"/>
-              <a:t>9/27/2020</a:t>
+              <a:t>8/23/2021</a:t>
             </a:fld>
             <a:endParaRPr lang="en-US"/>
           </a:p>
@@ -10122,57 +10127,57 @@
           <a:lstStyle/>
           <a:p>
             <a:r>
-              <a:rPr lang="en-US" sz="1300"/>
+              <a:rPr lang="en-US" sz="1300" dirty="0"/>
               <a:t>Based on our clustering algorithm and the available variables in the dataset, we segmented our customers into 4 clusters</a:t>
             </a:r>
           </a:p>
           <a:p>
             <a:r>
-              <a:rPr lang="en-US" sz="1300"/>
-              <a:t>Cluster 1 – customers that earn a low income </a:t>
-            </a:r>
-          </a:p>
-          <a:p>
-            <a:r>
-              <a:rPr lang="en-US" sz="1300"/>
+              <a:rPr lang="en-US" sz="1300" dirty="0"/>
+              <a:t>Cluster 1 - customers that earn a low income </a:t>
+            </a:r>
+          </a:p>
+          <a:p>
+            <a:r>
+              <a:rPr lang="en-US" sz="1300" dirty="0"/>
               <a:t>Cluster 2- Customers that a earn the lowest  income</a:t>
             </a:r>
           </a:p>
           <a:p>
             <a:r>
-              <a:rPr lang="en-US" sz="1300"/>
-              <a:t>Cluster 3 – Customers that earn a very high income</a:t>
-            </a:r>
-          </a:p>
-          <a:p>
-            <a:r>
-              <a:rPr lang="en-US" sz="1300"/>
-              <a:t>Cluster 4 – Customers that earn a lower income</a:t>
-            </a:r>
-          </a:p>
-          <a:p>
-            <a:r>
-              <a:rPr lang="en-US" sz="1300"/>
-              <a:t>Customers that earn the lowest income</a:t>
-            </a:r>
-          </a:p>
-          <a:p>
-            <a:endParaRPr lang="en-US" sz="1300"/>
-          </a:p>
-          <a:p>
-            <a:r>
-              <a:rPr lang="en-US" sz="1300"/>
-              <a:t>The customer segments can be found in each relationship status but the high earners are mostly seen in the single and divorced ones.</a:t>
-            </a:r>
-          </a:p>
-          <a:p>
-            <a:r>
-              <a:rPr lang="en-US" sz="1300"/>
+              <a:rPr lang="en-US" sz="1300" dirty="0"/>
+              <a:t>Cluster 3 - Customers that earn a very high income</a:t>
+            </a:r>
+          </a:p>
+          <a:p>
+            <a:r>
+              <a:rPr lang="en-US" sz="1300" dirty="0"/>
+              <a:t>Cluster 4 - Customers that earn a lower income</a:t>
+            </a:r>
+          </a:p>
+          <a:p>
+            <a:r>
+              <a:rPr lang="en-US" sz="1300" dirty="0"/>
+              <a:t>Cluster 5 - Customers that earn the lowest income</a:t>
+            </a:r>
+          </a:p>
+          <a:p>
+            <a:endParaRPr lang="en-US" sz="1300" dirty="0"/>
+          </a:p>
+          <a:p>
+            <a:r>
+              <a:rPr lang="en-US" sz="1300" dirty="0"/>
+              <a:t>The customer segments can be found in each relationship status, but the high earners are mostly seen in the single and divorced ones.</a:t>
+            </a:r>
+          </a:p>
+          <a:p>
+            <a:r>
+              <a:rPr lang="en-US" sz="1300" dirty="0"/>
               <a:t>The total income can be an indicator of the customer purchasing power, but it does not explain what the total expense of the customer may be. The total expense recurrently incurred by a customer will affect his purchasing power.</a:t>
             </a:r>
           </a:p>
           <a:p>
-            <a:endParaRPr lang="en-US" sz="1300"/>
+            <a:endParaRPr lang="en-US" sz="1300" dirty="0"/>
           </a:p>
         </p:txBody>
       </p:sp>
@@ -10534,19 +10539,19 @@
           <a:lstStyle/>
           <a:p>
             <a:r>
-              <a:rPr lang="en-CA" sz="1400" b="1"/>
+              <a:rPr lang="en-CA" sz="1400" b="1" dirty="0"/>
               <a:t>What are the potential challenges/risks to consider when targeting this segment vs. others?</a:t>
             </a:r>
           </a:p>
           <a:p>
             <a:r>
-              <a:rPr lang="en-CA" sz="1400"/>
-              <a:t>High income earners tend to have a lot of options at their disposal for any particular product. So the cost of acquisition of this customer segment is very high as we will have to spend more on adverts to convince them. However, since their buying decision is not based on price, this customer segment tend to be loyal to a particular product. Therefore they have a higher lifetime value when compared to the low owners, who are always looking out for the next price deal.</a:t>
-            </a:r>
-          </a:p>
-          <a:p>
-            <a:r>
-              <a:rPr lang="en-CA" sz="1400"/>
+              <a:rPr lang="en-CA" sz="1400" dirty="0"/>
+              <a:t>High income earners tend to have a lot of options at their disposal for any particular product. So, the cost of acquisition of this customer segment is very high as we will have to spend more on adverts to convince them. However, since their buying decision is not based on price, this customer segment tend to be loyal to a particular product. Therefore, they have a higher lifetime value when compared to the low owners, who are always looking out for the next price deal.</a:t>
+            </a:r>
+          </a:p>
+          <a:p>
+            <a:r>
+              <a:rPr lang="en-CA" sz="1400" dirty="0"/>
               <a:t>However, consideration of the customers in the segment will have to take note of the industry of occupation of the customers, as the amount spent showed a relationship with the industry of occupation of the customers.</a:t>
             </a:r>
           </a:p>

</xml_diff>